<commit_message>
Enhanced Wiring Module to support no Column definde in IO Shhet
</commit_message>
<xml_diff>
--- a/Excel/Yokogawa EEC One Project Enhancement.pptx
+++ b/Excel/Yokogawa EEC One Project Enhancement.pptx
@@ -298,7 +298,7 @@
                 <a:ea typeface="+mn-ea"/>
               </a:rPr>
               <a:pPr algn="ctr"/>
-              <a:t>8/31/2017</a:t>
+              <a:t>9/3/2017</a:t>
             </a:fld>
             <a:endParaRPr lang="en-US" sz="900">
               <a:latin typeface="Arial" pitchFamily="34" charset="0"/>
@@ -21089,6 +21089,144 @@
               <a:t> 버튼으로 실행 또는 취소 가능</a:t>
             </a:r>
             <a:endParaRPr lang="de-DE" dirty="0"/>
+          </a:p>
+        </p:txBody>
+      </p:sp>
+      <p:sp>
+        <p:nvSpPr>
+          <p:cNvPr id="6" name="TextBox 5"/>
+          <p:cNvSpPr txBox="1"/>
+          <p:nvPr/>
+        </p:nvSpPr>
+        <p:spPr bwMode="gray">
+          <a:xfrm>
+            <a:off x="6047030" y="3013730"/>
+            <a:ext cx="2269386" cy="299295"/>
+          </a:xfrm>
+          <a:prstGeom prst="rect">
+            <a:avLst/>
+          </a:prstGeom>
+          <a:noFill/>
+        </p:spPr>
+        <p:txBody>
+          <a:bodyPr wrap="none" lIns="72000" tIns="72000" rIns="72000" bIns="72000" rtlCol="0">
+            <a:spAutoFit/>
+          </a:bodyPr>
+          <a:lstStyle/>
+          <a:p>
+            <a:pPr>
+              <a:spcBef>
+                <a:spcPts val="400"/>
+              </a:spcBef>
+              <a:spcAft>
+                <a:spcPts val="400"/>
+              </a:spcAft>
+              <a:buClr>
+                <a:schemeClr val="accent2"/>
+              </a:buClr>
+            </a:pPr>
+            <a:r>
+              <a:rPr lang="ko-KR" altLang="en-US" sz="1000" b="1" dirty="0">
+                <a:solidFill>
+                  <a:srgbClr val="0000FF"/>
+                </a:solidFill>
+                <a:latin typeface="+mn-lt"/>
+              </a:rPr>
+              <a:t>정렬시트</a:t>
+            </a:r>
+            <a:r>
+              <a:rPr lang="en-US" altLang="ko-KR" sz="1000" b="1" dirty="0">
+                <a:solidFill>
+                  <a:srgbClr val="0000FF"/>
+                </a:solidFill>
+                <a:latin typeface="+mn-lt"/>
+              </a:rPr>
+              <a:t>_</a:t>
+            </a:r>
+            <a:r>
+              <a:rPr lang="en-US" altLang="ko-KR" sz="1000" b="1" dirty="0" smtClean="0">
+                <a:solidFill>
+                  <a:srgbClr val="0000FF"/>
+                </a:solidFill>
+                <a:latin typeface="+mn-lt"/>
+              </a:rPr>
+              <a:t>Total_Loop_Sample.xlsm</a:t>
+            </a:r>
+            <a:endParaRPr lang="ko-KR" altLang="en-US" sz="1000" b="1" dirty="0" smtClean="0">
+              <a:solidFill>
+                <a:srgbClr val="0000FF"/>
+              </a:solidFill>
+              <a:latin typeface="+mn-lt"/>
+            </a:endParaRPr>
+          </a:p>
+        </p:txBody>
+      </p:sp>
+      <p:sp>
+        <p:nvSpPr>
+          <p:cNvPr id="13" name="TextBox 12"/>
+          <p:cNvSpPr txBox="1"/>
+          <p:nvPr/>
+        </p:nvSpPr>
+        <p:spPr bwMode="gray">
+          <a:xfrm>
+            <a:off x="2156029" y="3013730"/>
+            <a:ext cx="1911915" cy="299295"/>
+          </a:xfrm>
+          <a:prstGeom prst="rect">
+            <a:avLst/>
+          </a:prstGeom>
+          <a:noFill/>
+        </p:spPr>
+        <p:txBody>
+          <a:bodyPr wrap="none" lIns="72000" tIns="72000" rIns="72000" bIns="72000" rtlCol="0">
+            <a:spAutoFit/>
+          </a:bodyPr>
+          <a:lstStyle/>
+          <a:p>
+            <a:pPr>
+              <a:spcBef>
+                <a:spcPts val="400"/>
+              </a:spcBef>
+              <a:spcAft>
+                <a:spcPts val="400"/>
+              </a:spcAft>
+              <a:buClr>
+                <a:schemeClr val="accent2"/>
+              </a:buClr>
+            </a:pPr>
+            <a:r>
+              <a:rPr lang="ko-KR" altLang="en-US" sz="1000" b="1" dirty="0">
+                <a:solidFill>
+                  <a:srgbClr val="0000FF"/>
+                </a:solidFill>
+                <a:latin typeface="+mn-lt"/>
+              </a:rPr>
+              <a:t>정렬시트</a:t>
+            </a:r>
+            <a:r>
+              <a:rPr lang="en-US" altLang="ko-KR" sz="1000" b="1" dirty="0">
+                <a:solidFill>
+                  <a:srgbClr val="0000FF"/>
+                </a:solidFill>
+                <a:latin typeface="+mn-lt"/>
+              </a:rPr>
+              <a:t>_</a:t>
+            </a:r>
+            <a:r>
+              <a:rPr lang="en-US" altLang="ko-KR" sz="1000" b="1" dirty="0" smtClean="0">
+                <a:solidFill>
+                  <a:srgbClr val="0000FF"/>
+                </a:solidFill>
+                <a:latin typeface="+mn-lt"/>
+              </a:rPr>
+              <a:t>wiring_Sample.xlsx</a:t>
+            </a:r>
+            <a:endParaRPr lang="ko-KR" altLang="en-US" sz="1000" b="1" dirty="0" smtClean="0">
+              <a:solidFill>
+                <a:srgbClr val="0000FF"/>
+              </a:solidFill>
+              <a:latin typeface="+mn-lt"/>
+            </a:endParaRPr>
           </a:p>
         </p:txBody>
       </p:sp>
@@ -29854,12 +29992,6 @@
 </file>
 
 <file path=customXml/item1.xml><?xml version="1.0" encoding="utf-8"?>
-<p:properties xmlns:p="http://schemas.microsoft.com/office/2006/metadata/properties" xmlns:xsi="http://www.w3.org/2001/XMLSchema-instance" xmlns:pc="http://schemas.microsoft.com/office/infopath/2007/PartnerControls">
-  <documentManagement/>
-</p:properties>
-</file>
-
-<file path=customXml/item2.xml><?xml version="1.0" encoding="utf-8"?>
 <ct:contentTypeSchema xmlns:ct="http://schemas.microsoft.com/office/2006/metadata/contentType" xmlns:ma="http://schemas.microsoft.com/office/2006/metadata/properties/metaAttributes" ct:_="" ma:_="" ma:contentTypeName="Document" ma:contentTypeID="0x010100EB5991E2ED87A141B01453B5F44A351F" ma:contentTypeVersion="0" ma:contentTypeDescription="Create a new document." ma:contentTypeScope="" ma:versionID="ddbb8c543882358b2257c40eaaf8cdc2">
   <xsd:schema xmlns:xsd="http://www.w3.org/2001/XMLSchema" xmlns:xs="http://www.w3.org/2001/XMLSchema" xmlns:p="http://schemas.microsoft.com/office/2006/metadata/properties" targetNamespace="http://schemas.microsoft.com/office/2006/metadata/properties" ma:root="true" ma:fieldsID="06e0e3112098b4d1518554ee266199a9">
     <xsd:element name="properties">
@@ -29973,6 +30105,12 @@
 </ct:contentTypeSchema>
 </file>
 
+<file path=customXml/item2.xml><?xml version="1.0" encoding="utf-8"?>
+<p:properties xmlns:p="http://schemas.microsoft.com/office/2006/metadata/properties" xmlns:xsi="http://www.w3.org/2001/XMLSchema-instance" xmlns:pc="http://schemas.microsoft.com/office/infopath/2007/PartnerControls">
+  <documentManagement/>
+</p:properties>
+</file>
+
 <file path=customXml/item3.xml><?xml version="1.0" encoding="utf-8"?>
 <?mso-contentType ?>
 <FormTemplates xmlns="http://schemas.microsoft.com/sharepoint/v3/contenttype/forms">
@@ -29983,21 +30121,6 @@
 </file>
 
 <file path=customXml/itemProps1.xml><?xml version="1.0" encoding="utf-8"?>
-<ds:datastoreItem xmlns:ds="http://schemas.openxmlformats.org/officeDocument/2006/customXml" ds:itemID="{DFE7DD84-0BC3-4CD3-B6D2-F464606E6960}">
-  <ds:schemaRefs>
-    <ds:schemaRef ds:uri="http://purl.org/dc/terms/"/>
-    <ds:schemaRef ds:uri="http://purl.org/dc/elements/1.1/"/>
-    <ds:schemaRef ds:uri="http://schemas.microsoft.com/office/2006/documentManagement/types"/>
-    <ds:schemaRef ds:uri="http://schemas.openxmlformats.org/package/2006/metadata/core-properties"/>
-    <ds:schemaRef ds:uri="http://www.w3.org/XML/1998/namespace"/>
-    <ds:schemaRef ds:uri="http://purl.org/dc/dcmitype/"/>
-    <ds:schemaRef ds:uri="http://schemas.microsoft.com/office/infopath/2007/PartnerControls"/>
-    <ds:schemaRef ds:uri="http://schemas.microsoft.com/office/2006/metadata/properties"/>
-  </ds:schemaRefs>
-</ds:datastoreItem>
-</file>
-
-<file path=customXml/itemProps2.xml><?xml version="1.0" encoding="utf-8"?>
 <ds:datastoreItem xmlns:ds="http://schemas.openxmlformats.org/officeDocument/2006/customXml" ds:itemID="{5D65BC48-93BB-4A89-A6E0-CA93D63F4CBC}">
   <ds:schemaRefs>
     <ds:schemaRef ds:uri="http://schemas.microsoft.com/office/2006/metadata/contentType"/>
@@ -30013,6 +30136,21 @@
 </ds:datastoreItem>
 </file>
 
+<file path=customXml/itemProps2.xml><?xml version="1.0" encoding="utf-8"?>
+<ds:datastoreItem xmlns:ds="http://schemas.openxmlformats.org/officeDocument/2006/customXml" ds:itemID="{DFE7DD84-0BC3-4CD3-B6D2-F464606E6960}">
+  <ds:schemaRefs>
+    <ds:schemaRef ds:uri="http://purl.org/dc/terms/"/>
+    <ds:schemaRef ds:uri="http://purl.org/dc/elements/1.1/"/>
+    <ds:schemaRef ds:uri="http://schemas.microsoft.com/office/2006/documentManagement/types"/>
+    <ds:schemaRef ds:uri="http://schemas.openxmlformats.org/package/2006/metadata/core-properties"/>
+    <ds:schemaRef ds:uri="http://www.w3.org/XML/1998/namespace"/>
+    <ds:schemaRef ds:uri="http://purl.org/dc/dcmitype/"/>
+    <ds:schemaRef ds:uri="http://schemas.microsoft.com/office/infopath/2007/PartnerControls"/>
+    <ds:schemaRef ds:uri="http://schemas.microsoft.com/office/2006/metadata/properties"/>
+  </ds:schemaRefs>
+</ds:datastoreItem>
+</file>
+
 <file path=customXml/itemProps3.xml><?xml version="1.0" encoding="utf-8"?>
 <ds:datastoreItem xmlns:ds="http://schemas.openxmlformats.org/officeDocument/2006/customXml" ds:itemID="{0DA177A8-CACE-4610-B28F-A6D31A2A3C4D}">
   <ds:schemaRefs>

</xml_diff>